<commit_message>
Balance Changes, beginning of Campaign Rules
</commit_message>
<xml_diff>
--- a/Characters/Basics/20P - Gunslinger.pptx
+++ b/Characters/Basics/20P - Gunslinger.pptx
@@ -243,7 +243,7 @@
           <a:p>
             <a:fld id="{0B4D85F4-ACAB-4D02-9EB8-5027950E88E8}" type="datetimeFigureOut">
               <a:rPr lang="de-AT" smtClean="0"/>
-              <a:t>26.11.2016</a:t>
+              <a:t>29.12.2016</a:t>
             </a:fld>
             <a:endParaRPr lang="de-AT"/>
           </a:p>
@@ -413,7 +413,7 @@
           <a:p>
             <a:fld id="{0B4D85F4-ACAB-4D02-9EB8-5027950E88E8}" type="datetimeFigureOut">
               <a:rPr lang="de-AT" smtClean="0"/>
-              <a:t>26.11.2016</a:t>
+              <a:t>29.12.2016</a:t>
             </a:fld>
             <a:endParaRPr lang="de-AT"/>
           </a:p>
@@ -593,7 +593,7 @@
           <a:p>
             <a:fld id="{0B4D85F4-ACAB-4D02-9EB8-5027950E88E8}" type="datetimeFigureOut">
               <a:rPr lang="de-AT" smtClean="0"/>
-              <a:t>26.11.2016</a:t>
+              <a:t>29.12.2016</a:t>
             </a:fld>
             <a:endParaRPr lang="de-AT"/>
           </a:p>
@@ -763,7 +763,7 @@
           <a:p>
             <a:fld id="{0B4D85F4-ACAB-4D02-9EB8-5027950E88E8}" type="datetimeFigureOut">
               <a:rPr lang="de-AT" smtClean="0"/>
-              <a:t>26.11.2016</a:t>
+              <a:t>29.12.2016</a:t>
             </a:fld>
             <a:endParaRPr lang="de-AT"/>
           </a:p>
@@ -1007,7 +1007,7 @@
           <a:p>
             <a:fld id="{0B4D85F4-ACAB-4D02-9EB8-5027950E88E8}" type="datetimeFigureOut">
               <a:rPr lang="de-AT" smtClean="0"/>
-              <a:t>26.11.2016</a:t>
+              <a:t>29.12.2016</a:t>
             </a:fld>
             <a:endParaRPr lang="de-AT"/>
           </a:p>
@@ -1239,7 +1239,7 @@
           <a:p>
             <a:fld id="{0B4D85F4-ACAB-4D02-9EB8-5027950E88E8}" type="datetimeFigureOut">
               <a:rPr lang="de-AT" smtClean="0"/>
-              <a:t>26.11.2016</a:t>
+              <a:t>29.12.2016</a:t>
             </a:fld>
             <a:endParaRPr lang="de-AT"/>
           </a:p>
@@ -1606,7 +1606,7 @@
           <a:p>
             <a:fld id="{0B4D85F4-ACAB-4D02-9EB8-5027950E88E8}" type="datetimeFigureOut">
               <a:rPr lang="de-AT" smtClean="0"/>
-              <a:t>26.11.2016</a:t>
+              <a:t>29.12.2016</a:t>
             </a:fld>
             <a:endParaRPr lang="de-AT"/>
           </a:p>
@@ -1724,7 +1724,7 @@
           <a:p>
             <a:fld id="{0B4D85F4-ACAB-4D02-9EB8-5027950E88E8}" type="datetimeFigureOut">
               <a:rPr lang="de-AT" smtClean="0"/>
-              <a:t>26.11.2016</a:t>
+              <a:t>29.12.2016</a:t>
             </a:fld>
             <a:endParaRPr lang="de-AT"/>
           </a:p>
@@ -1819,7 +1819,7 @@
           <a:p>
             <a:fld id="{0B4D85F4-ACAB-4D02-9EB8-5027950E88E8}" type="datetimeFigureOut">
               <a:rPr lang="de-AT" smtClean="0"/>
-              <a:t>26.11.2016</a:t>
+              <a:t>29.12.2016</a:t>
             </a:fld>
             <a:endParaRPr lang="de-AT"/>
           </a:p>
@@ -2096,7 +2096,7 @@
           <a:p>
             <a:fld id="{0B4D85F4-ACAB-4D02-9EB8-5027950E88E8}" type="datetimeFigureOut">
               <a:rPr lang="de-AT" smtClean="0"/>
-              <a:t>26.11.2016</a:t>
+              <a:t>29.12.2016</a:t>
             </a:fld>
             <a:endParaRPr lang="de-AT"/>
           </a:p>
@@ -2353,7 +2353,7 @@
           <a:p>
             <a:fld id="{0B4D85F4-ACAB-4D02-9EB8-5027950E88E8}" type="datetimeFigureOut">
               <a:rPr lang="de-AT" smtClean="0"/>
-              <a:t>26.11.2016</a:t>
+              <a:t>29.12.2016</a:t>
             </a:fld>
             <a:endParaRPr lang="de-AT"/>
           </a:p>
@@ -2566,7 +2566,7 @@
           <a:p>
             <a:fld id="{0B4D85F4-ACAB-4D02-9EB8-5027950E88E8}" type="datetimeFigureOut">
               <a:rPr lang="de-AT" smtClean="0"/>
-              <a:t>26.11.2016</a:t>
+              <a:t>29.12.2016</a:t>
             </a:fld>
             <a:endParaRPr lang="de-AT"/>
           </a:p>
@@ -4204,7 +4204,7 @@
           <p:nvPr>
             <p:extLst>
               <p:ext uri="{D42A27DB-BD31-4B8C-83A1-F6EECF244321}">
-                <p14:modId xmlns:p14="http://schemas.microsoft.com/office/powerpoint/2010/main" val="589945624"/>
+                <p14:modId xmlns:p14="http://schemas.microsoft.com/office/powerpoint/2010/main" val="2573163808"/>
               </p:ext>
             </p:extLst>
           </p:nvPr>
@@ -4644,7 +4644,7 @@
                           <a:effectLst/>
                           <a:latin typeface="Corbel" panose="020B0503020204020204" pitchFamily="34" charset="0"/>
                         </a:rPr>
-                        <a:t>15</a:t>
+                        <a:t>15cm</a:t>
                       </a:r>
                       <a:endParaRPr lang="de-AT" sz="1000" dirty="0">
                         <a:effectLst/>
@@ -4905,11 +4905,11 @@
                         </a:spcAft>
                       </a:pPr>
                       <a:r>
-                        <a:rPr lang="de-AT" sz="900" dirty="0">
+                        <a:rPr lang="de-AT" sz="900">
                           <a:effectLst/>
                           <a:latin typeface="Corbel" panose="020B0503020204020204" pitchFamily="34" charset="0"/>
                         </a:rPr>
-                        <a:t>15</a:t>
+                        <a:t>15cm</a:t>
                       </a:r>
                       <a:endParaRPr lang="de-AT" sz="1000" dirty="0">
                         <a:effectLst/>

</xml_diff>